<commit_message>
set up coding session
</commit_message>
<xml_diff>
--- a/events-coding-session.pptx
+++ b/events-coding-session.pptx
@@ -16,8 +16,8 @@
     <p:sldId id="259" r:id="rId10"/>
     <p:sldId id="260" r:id="rId11"/>
     <p:sldId id="263" r:id="rId12"/>
-    <p:sldId id="262" r:id="rId13"/>
-    <p:sldId id="266" r:id="rId14"/>
+    <p:sldId id="266" r:id="rId13"/>
+    <p:sldId id="262" r:id="rId14"/>
     <p:sldId id="264" r:id="rId15"/>
     <p:sldId id="265" r:id="rId16"/>
     <p:sldId id="267" r:id="rId17"/>
@@ -276,7 +276,7 @@
           <a:p>
             <a:fld id="{C1BA92A5-DE8A-6741-AA42-ED5C19DA102F}" type="datetimeFigureOut">
               <a:rPr lang="en-US" smtClean="0"/>
-              <a:t>6/20/20</a:t>
+              <a:t>6/21/20</a:t>
             </a:fld>
             <a:endParaRPr lang="en-US"/>
           </a:p>
@@ -474,7 +474,7 @@
           <a:p>
             <a:fld id="{C1BA92A5-DE8A-6741-AA42-ED5C19DA102F}" type="datetimeFigureOut">
               <a:rPr lang="en-US" smtClean="0"/>
-              <a:t>6/20/20</a:t>
+              <a:t>6/21/20</a:t>
             </a:fld>
             <a:endParaRPr lang="en-US"/>
           </a:p>
@@ -682,7 +682,7 @@
           <a:p>
             <a:fld id="{C1BA92A5-DE8A-6741-AA42-ED5C19DA102F}" type="datetimeFigureOut">
               <a:rPr lang="en-US" smtClean="0"/>
-              <a:t>6/20/20</a:t>
+              <a:t>6/21/20</a:t>
             </a:fld>
             <a:endParaRPr lang="en-US"/>
           </a:p>
@@ -880,7 +880,7 @@
           <a:p>
             <a:fld id="{C1BA92A5-DE8A-6741-AA42-ED5C19DA102F}" type="datetimeFigureOut">
               <a:rPr lang="en-US" smtClean="0"/>
-              <a:t>6/20/20</a:t>
+              <a:t>6/21/20</a:t>
             </a:fld>
             <a:endParaRPr lang="en-US"/>
           </a:p>
@@ -1155,7 +1155,7 @@
           <a:p>
             <a:fld id="{C1BA92A5-DE8A-6741-AA42-ED5C19DA102F}" type="datetimeFigureOut">
               <a:rPr lang="en-US" smtClean="0"/>
-              <a:t>6/20/20</a:t>
+              <a:t>6/21/20</a:t>
             </a:fld>
             <a:endParaRPr lang="en-US"/>
           </a:p>
@@ -1420,7 +1420,7 @@
           <a:p>
             <a:fld id="{C1BA92A5-DE8A-6741-AA42-ED5C19DA102F}" type="datetimeFigureOut">
               <a:rPr lang="en-US" smtClean="0"/>
-              <a:t>6/20/20</a:t>
+              <a:t>6/21/20</a:t>
             </a:fld>
             <a:endParaRPr lang="en-US"/>
           </a:p>
@@ -1832,7 +1832,7 @@
           <a:p>
             <a:fld id="{C1BA92A5-DE8A-6741-AA42-ED5C19DA102F}" type="datetimeFigureOut">
               <a:rPr lang="en-US" smtClean="0"/>
-              <a:t>6/20/20</a:t>
+              <a:t>6/21/20</a:t>
             </a:fld>
             <a:endParaRPr lang="en-US"/>
           </a:p>
@@ -1973,7 +1973,7 @@
           <a:p>
             <a:fld id="{C1BA92A5-DE8A-6741-AA42-ED5C19DA102F}" type="datetimeFigureOut">
               <a:rPr lang="en-US" smtClean="0"/>
-              <a:t>6/20/20</a:t>
+              <a:t>6/21/20</a:t>
             </a:fld>
             <a:endParaRPr lang="en-US"/>
           </a:p>
@@ -2086,7 +2086,7 @@
           <a:p>
             <a:fld id="{C1BA92A5-DE8A-6741-AA42-ED5C19DA102F}" type="datetimeFigureOut">
               <a:rPr lang="en-US" smtClean="0"/>
-              <a:t>6/20/20</a:t>
+              <a:t>6/21/20</a:t>
             </a:fld>
             <a:endParaRPr lang="en-US"/>
           </a:p>
@@ -2397,7 +2397,7 @@
           <a:p>
             <a:fld id="{C1BA92A5-DE8A-6741-AA42-ED5C19DA102F}" type="datetimeFigureOut">
               <a:rPr lang="en-US" smtClean="0"/>
-              <a:t>6/20/20</a:t>
+              <a:t>6/21/20</a:t>
             </a:fld>
             <a:endParaRPr lang="en-US"/>
           </a:p>
@@ -2685,7 +2685,7 @@
           <a:p>
             <a:fld id="{C1BA92A5-DE8A-6741-AA42-ED5C19DA102F}" type="datetimeFigureOut">
               <a:rPr lang="en-US" smtClean="0"/>
-              <a:t>6/20/20</a:t>
+              <a:t>6/21/20</a:t>
             </a:fld>
             <a:endParaRPr lang="en-US"/>
           </a:p>
@@ -2926,7 +2926,7 @@
           <a:p>
             <a:fld id="{C1BA92A5-DE8A-6741-AA42-ED5C19DA102F}" type="datetimeFigureOut">
               <a:rPr lang="en-US" smtClean="0"/>
-              <a:t>6/20/20</a:t>
+              <a:t>6/21/20</a:t>
             </a:fld>
             <a:endParaRPr lang="en-US"/>
           </a:p>
@@ -4360,6 +4360,53 @@
       </p:grpSpPr>
       <p:sp>
         <p:nvSpPr>
+          <p:cNvPr id="9" name="Oval 8">
+            <a:extLst>
+              <a:ext uri="{FF2B5EF4-FFF2-40B4-BE49-F238E27FC236}">
+                <a16:creationId xmlns:a16="http://schemas.microsoft.com/office/drawing/2014/main" id="{D10C1CBC-6FA7-564A-A72C-24835C409F2A}"/>
+              </a:ext>
+            </a:extLst>
+          </p:cNvPr>
+          <p:cNvSpPr/>
+          <p:nvPr/>
+        </p:nvSpPr>
+        <p:spPr>
+          <a:xfrm>
+            <a:off x="8775212" y="3745523"/>
+            <a:ext cx="2813050" cy="2678121"/>
+          </a:xfrm>
+          <a:prstGeom prst="ellipse">
+            <a:avLst/>
+          </a:prstGeom>
+          <a:ln>
+            <a:noFill/>
+          </a:ln>
+        </p:spPr>
+        <p:style>
+          <a:lnRef idx="2">
+            <a:schemeClr val="accent6"/>
+          </a:lnRef>
+          <a:fillRef idx="1">
+            <a:schemeClr val="lt1"/>
+          </a:fillRef>
+          <a:effectRef idx="0">
+            <a:schemeClr val="accent6"/>
+          </a:effectRef>
+          <a:fontRef idx="minor">
+            <a:schemeClr val="dk1"/>
+          </a:fontRef>
+        </p:style>
+        <p:txBody>
+          <a:bodyPr rtlCol="0" anchor="ctr"/>
+          <a:lstStyle/>
+          <a:p>
+            <a:pPr algn="ctr"/>
+            <a:endParaRPr lang="en-US"/>
+          </a:p>
+        </p:txBody>
+      </p:sp>
+      <p:sp>
+        <p:nvSpPr>
           <p:cNvPr id="2" name="Title 1">
             <a:extLst>
               <a:ext uri="{FF2B5EF4-FFF2-40B4-BE49-F238E27FC236}">
@@ -4419,7 +4466,7 @@
         </p:spPr>
         <p:txBody>
           <a:bodyPr>
-            <a:normAutofit fontScale="70000" lnSpcReduction="20000"/>
+            <a:normAutofit/>
           </a:bodyPr>
           <a:lstStyle/>
           <a:p>
@@ -4432,7 +4479,23 @@
                 <a:ea typeface="Open Sans" panose="020B0606030504020204" pitchFamily="34" charset="0"/>
                 <a:cs typeface="Open Sans" panose="020B0606030504020204" pitchFamily="34" charset="0"/>
               </a:rPr>
-              <a:t>Create a function called </a:t>
+              <a:t>Add an on ‘click’ event listener to the cookie jar &lt;</a:t>
+            </a:r>
+            <a:r>
+              <a:rPr lang="en-US" dirty="0" err="1">
+                <a:latin typeface="Open Sans" panose="020B0606030504020204" pitchFamily="34" charset="0"/>
+                <a:ea typeface="Open Sans" panose="020B0606030504020204" pitchFamily="34" charset="0"/>
+                <a:cs typeface="Open Sans" panose="020B0606030504020204" pitchFamily="34" charset="0"/>
+              </a:rPr>
+              <a:t>img</a:t>
+            </a:r>
+            <a:r>
+              <a:rPr lang="en-US" dirty="0">
+                <a:latin typeface="Open Sans" panose="020B0606030504020204" pitchFamily="34" charset="0"/>
+                <a:ea typeface="Open Sans" panose="020B0606030504020204" pitchFamily="34" charset="0"/>
+                <a:cs typeface="Open Sans" panose="020B0606030504020204" pitchFamily="34" charset="0"/>
+              </a:rPr>
+              <a:t>&gt; element that calls on the </a:t>
             </a:r>
             <a:r>
               <a:rPr lang="en-US" b="1" dirty="0" err="1">
@@ -4456,7 +4519,7 @@
                 <a:ea typeface="Open Sans" panose="020B0606030504020204" pitchFamily="34" charset="0"/>
                 <a:cs typeface="Open Sans" panose="020B0606030504020204" pitchFamily="34" charset="0"/>
               </a:rPr>
-              <a:t>that does the following:</a:t>
+              <a:t>function you will make in the next step</a:t>
             </a:r>
           </a:p>
           <a:p>
@@ -4470,222 +4533,6 @@
             </a:endParaRPr>
           </a:p>
           <a:p>
-            <a:pPr marL="514350" indent="-514350">
-              <a:buFont typeface="+mj-lt"/>
-              <a:buAutoNum type="arabicPeriod"/>
-            </a:pPr>
-            <a:r>
-              <a:rPr lang="en-US" dirty="0">
-                <a:latin typeface="Open Sans" panose="020B0606030504020204" pitchFamily="34" charset="0"/>
-                <a:ea typeface="Open Sans" panose="020B0606030504020204" pitchFamily="34" charset="0"/>
-                <a:cs typeface="Open Sans" panose="020B0606030504020204" pitchFamily="34" charset="0"/>
-              </a:rPr>
-              <a:t>Create an &lt;</a:t>
-            </a:r>
-            <a:r>
-              <a:rPr lang="en-US" dirty="0" err="1">
-                <a:latin typeface="Open Sans" panose="020B0606030504020204" pitchFamily="34" charset="0"/>
-                <a:ea typeface="Open Sans" panose="020B0606030504020204" pitchFamily="34" charset="0"/>
-                <a:cs typeface="Open Sans" panose="020B0606030504020204" pitchFamily="34" charset="0"/>
-              </a:rPr>
-              <a:t>img</a:t>
-            </a:r>
-            <a:r>
-              <a:rPr lang="en-US" dirty="0">
-                <a:latin typeface="Open Sans" panose="020B0606030504020204" pitchFamily="34" charset="0"/>
-                <a:ea typeface="Open Sans" panose="020B0606030504020204" pitchFamily="34" charset="0"/>
-                <a:cs typeface="Open Sans" panose="020B0606030504020204" pitchFamily="34" charset="0"/>
-              </a:rPr>
-              <a:t>&gt; element</a:t>
-            </a:r>
-          </a:p>
-          <a:p>
-            <a:pPr marL="514350" indent="-514350">
-              <a:buFont typeface="+mj-lt"/>
-              <a:buAutoNum type="arabicPeriod"/>
-            </a:pPr>
-            <a:r>
-              <a:rPr lang="en-US" dirty="0">
-                <a:latin typeface="Open Sans" panose="020B0606030504020204" pitchFamily="34" charset="0"/>
-                <a:ea typeface="Open Sans" panose="020B0606030504020204" pitchFamily="34" charset="0"/>
-                <a:cs typeface="Open Sans" panose="020B0606030504020204" pitchFamily="34" charset="0"/>
-              </a:rPr>
-              <a:t>Adds the ‘cookie’ class to the element</a:t>
-            </a:r>
-          </a:p>
-          <a:p>
-            <a:pPr marL="514350" indent="-514350">
-              <a:buFont typeface="+mj-lt"/>
-              <a:buAutoNum type="arabicPeriod"/>
-            </a:pPr>
-            <a:r>
-              <a:rPr lang="en-US" dirty="0">
-                <a:latin typeface="Open Sans" panose="020B0606030504020204" pitchFamily="34" charset="0"/>
-                <a:ea typeface="Open Sans" panose="020B0606030504020204" pitchFamily="34" charset="0"/>
-                <a:cs typeface="Open Sans" panose="020B0606030504020204" pitchFamily="34" charset="0"/>
-              </a:rPr>
-              <a:t>Adjust the element based on the type of cookie selected in the dropdown menu</a:t>
-            </a:r>
-          </a:p>
-          <a:p>
-            <a:pPr lvl="1"/>
-            <a:r>
-              <a:rPr lang="en-US" dirty="0">
-                <a:latin typeface="Open Sans" panose="020B0606030504020204" pitchFamily="34" charset="0"/>
-                <a:ea typeface="Open Sans" panose="020B0606030504020204" pitchFamily="34" charset="0"/>
-                <a:cs typeface="Open Sans" panose="020B0606030504020204" pitchFamily="34" charset="0"/>
-              </a:rPr>
-              <a:t>Use the </a:t>
-            </a:r>
-            <a:r>
-              <a:rPr lang="en-US" i="1" dirty="0" err="1">
-                <a:latin typeface="Open Sans" panose="020B0606030504020204" pitchFamily="34" charset="0"/>
-                <a:ea typeface="Open Sans" panose="020B0606030504020204" pitchFamily="34" charset="0"/>
-                <a:cs typeface="Open Sans" panose="020B0606030504020204" pitchFamily="34" charset="0"/>
-              </a:rPr>
-              <a:t>selectedCookie</a:t>
-            </a:r>
-            <a:r>
-              <a:rPr lang="en-US" dirty="0">
-                <a:latin typeface="Open Sans" panose="020B0606030504020204" pitchFamily="34" charset="0"/>
-                <a:ea typeface="Open Sans" panose="020B0606030504020204" pitchFamily="34" charset="0"/>
-                <a:cs typeface="Open Sans" panose="020B0606030504020204" pitchFamily="34" charset="0"/>
-              </a:rPr>
-              <a:t> variable to: </a:t>
-            </a:r>
-          </a:p>
-          <a:p>
-            <a:pPr lvl="2"/>
-            <a:r>
-              <a:rPr lang="en-US" dirty="0">
-                <a:latin typeface="Open Sans" panose="020B0606030504020204" pitchFamily="34" charset="0"/>
-                <a:ea typeface="Open Sans" panose="020B0606030504020204" pitchFamily="34" charset="0"/>
-                <a:cs typeface="Open Sans" panose="020B0606030504020204" pitchFamily="34" charset="0"/>
-              </a:rPr>
-              <a:t>assign the </a:t>
-            </a:r>
-            <a:r>
-              <a:rPr lang="en-US" dirty="0" err="1">
-                <a:latin typeface="Open Sans" panose="020B0606030504020204" pitchFamily="34" charset="0"/>
-                <a:ea typeface="Open Sans" panose="020B0606030504020204" pitchFamily="34" charset="0"/>
-                <a:cs typeface="Open Sans" panose="020B0606030504020204" pitchFamily="34" charset="0"/>
-              </a:rPr>
-              <a:t>src</a:t>
-            </a:r>
-            <a:r>
-              <a:rPr lang="en-US" dirty="0">
-                <a:latin typeface="Open Sans" panose="020B0606030504020204" pitchFamily="34" charset="0"/>
-                <a:ea typeface="Open Sans" panose="020B0606030504020204" pitchFamily="34" charset="0"/>
-                <a:cs typeface="Open Sans" panose="020B0606030504020204" pitchFamily="34" charset="0"/>
-              </a:rPr>
-              <a:t> of </a:t>
-            </a:r>
-            <a:r>
-              <a:rPr lang="en-US" dirty="0" err="1">
-                <a:latin typeface="Open Sans" panose="020B0606030504020204" pitchFamily="34" charset="0"/>
-                <a:ea typeface="Open Sans" panose="020B0606030504020204" pitchFamily="34" charset="0"/>
-                <a:cs typeface="Open Sans" panose="020B0606030504020204" pitchFamily="34" charset="0"/>
-              </a:rPr>
-              <a:t>img</a:t>
-            </a:r>
-            <a:r>
-              <a:rPr lang="en-US" dirty="0">
-                <a:latin typeface="Open Sans" panose="020B0606030504020204" pitchFamily="34" charset="0"/>
-                <a:ea typeface="Open Sans" panose="020B0606030504020204" pitchFamily="34" charset="0"/>
-                <a:cs typeface="Open Sans" panose="020B0606030504020204" pitchFamily="34" charset="0"/>
-              </a:rPr>
-              <a:t> element</a:t>
-            </a:r>
-          </a:p>
-          <a:p>
-            <a:pPr lvl="2"/>
-            <a:r>
-              <a:rPr lang="en-US" dirty="0">
-                <a:latin typeface="Open Sans" panose="020B0606030504020204" pitchFamily="34" charset="0"/>
-                <a:ea typeface="Open Sans" panose="020B0606030504020204" pitchFamily="34" charset="0"/>
-                <a:cs typeface="Open Sans" panose="020B0606030504020204" pitchFamily="34" charset="0"/>
-              </a:rPr>
-              <a:t>Add a unique class to the </a:t>
-            </a:r>
-            <a:r>
-              <a:rPr lang="en-US" dirty="0" err="1">
-                <a:latin typeface="Open Sans" panose="020B0606030504020204" pitchFamily="34" charset="0"/>
-                <a:ea typeface="Open Sans" panose="020B0606030504020204" pitchFamily="34" charset="0"/>
-                <a:cs typeface="Open Sans" panose="020B0606030504020204" pitchFamily="34" charset="0"/>
-              </a:rPr>
-              <a:t>img</a:t>
-            </a:r>
-            <a:r>
-              <a:rPr lang="en-US" dirty="0">
-                <a:latin typeface="Open Sans" panose="020B0606030504020204" pitchFamily="34" charset="0"/>
-                <a:ea typeface="Open Sans" panose="020B0606030504020204" pitchFamily="34" charset="0"/>
-                <a:cs typeface="Open Sans" panose="020B0606030504020204" pitchFamily="34" charset="0"/>
-              </a:rPr>
-              <a:t> element</a:t>
-            </a:r>
-          </a:p>
-          <a:p>
-            <a:pPr marL="514350" indent="-514350">
-              <a:buFont typeface="+mj-lt"/>
-              <a:buAutoNum type="arabicPeriod"/>
-            </a:pPr>
-            <a:r>
-              <a:rPr lang="en-US" dirty="0">
-                <a:latin typeface="Open Sans" panose="020B0606030504020204" pitchFamily="34" charset="0"/>
-                <a:ea typeface="Open Sans" panose="020B0606030504020204" pitchFamily="34" charset="0"/>
-                <a:cs typeface="Open Sans" panose="020B0606030504020204" pitchFamily="34" charset="0"/>
-              </a:rPr>
-              <a:t>Append cookie &lt;</a:t>
-            </a:r>
-            <a:r>
-              <a:rPr lang="en-US" dirty="0" err="1">
-                <a:latin typeface="Open Sans" panose="020B0606030504020204" pitchFamily="34" charset="0"/>
-                <a:ea typeface="Open Sans" panose="020B0606030504020204" pitchFamily="34" charset="0"/>
-                <a:cs typeface="Open Sans" panose="020B0606030504020204" pitchFamily="34" charset="0"/>
-              </a:rPr>
-              <a:t>img</a:t>
-            </a:r>
-            <a:r>
-              <a:rPr lang="en-US" dirty="0">
-                <a:latin typeface="Open Sans" panose="020B0606030504020204" pitchFamily="34" charset="0"/>
-                <a:ea typeface="Open Sans" panose="020B0606030504020204" pitchFamily="34" charset="0"/>
-                <a:cs typeface="Open Sans" panose="020B0606030504020204" pitchFamily="34" charset="0"/>
-              </a:rPr>
-              <a:t>&gt; element to the </a:t>
-            </a:r>
-            <a:br>
-              <a:rPr lang="en-US" dirty="0">
-                <a:latin typeface="Open Sans" panose="020B0606030504020204" pitchFamily="34" charset="0"/>
-                <a:ea typeface="Open Sans" panose="020B0606030504020204" pitchFamily="34" charset="0"/>
-                <a:cs typeface="Open Sans" panose="020B0606030504020204" pitchFamily="34" charset="0"/>
-              </a:rPr>
-            </a:br>
-            <a:r>
-              <a:rPr lang="en-US" i="1" dirty="0">
-                <a:latin typeface="Open Sans" panose="020B0606030504020204" pitchFamily="34" charset="0"/>
-                <a:ea typeface="Open Sans" panose="020B0606030504020204" pitchFamily="34" charset="0"/>
-                <a:cs typeface="Open Sans" panose="020B0606030504020204" pitchFamily="34" charset="0"/>
-              </a:rPr>
-              <a:t>#cookie-container</a:t>
-            </a:r>
-            <a:endParaRPr lang="en-US" dirty="0">
-              <a:latin typeface="Open Sans" panose="020B0606030504020204" pitchFamily="34" charset="0"/>
-              <a:ea typeface="Open Sans" panose="020B0606030504020204" pitchFamily="34" charset="0"/>
-              <a:cs typeface="Open Sans" panose="020B0606030504020204" pitchFamily="34" charset="0"/>
-            </a:endParaRPr>
-          </a:p>
-          <a:p>
-            <a:pPr marL="514350" indent="-514350">
-              <a:buFont typeface="+mj-lt"/>
-              <a:buAutoNum type="arabicPeriod"/>
-            </a:pPr>
-            <a:endParaRPr lang="en-US" dirty="0">
-              <a:latin typeface="Open Sans" panose="020B0606030504020204" pitchFamily="34" charset="0"/>
-              <a:ea typeface="Open Sans" panose="020B0606030504020204" pitchFamily="34" charset="0"/>
-              <a:cs typeface="Open Sans" panose="020B0606030504020204" pitchFamily="34" charset="0"/>
-            </a:endParaRPr>
-          </a:p>
-          <a:p>
             <a:pPr marL="0" indent="0">
               <a:buNone/>
             </a:pPr>
@@ -4706,31 +4553,7 @@
               <a:rPr lang="en-US" sz="1800" dirty="0">
                 <a:hlinkClick r:id="rId2"/>
               </a:rPr>
-              <a:t>https://developer.mozilla.org/en-US/docs/Web/API/Element/classList</a:t>
-            </a:r>
-            <a:endParaRPr lang="en-US" sz="1800" dirty="0"/>
-          </a:p>
-          <a:p>
-            <a:pPr marL="0" indent="0">
-              <a:buNone/>
-            </a:pPr>
-            <a:r>
-              <a:rPr lang="en-US" sz="1800" dirty="0">
-                <a:hlinkClick r:id="rId3"/>
-              </a:rPr>
-              <a:t>https://developer.mozilla.org/en-US/docs/Web/API/ParentNode/append</a:t>
-            </a:r>
-            <a:endParaRPr lang="en-US" sz="1800" dirty="0"/>
-          </a:p>
-          <a:p>
-            <a:pPr marL="0" indent="0">
-              <a:buNone/>
-            </a:pPr>
-            <a:r>
-              <a:rPr lang="en-US" sz="1800" dirty="0">
-                <a:hlinkClick r:id="rId4"/>
-              </a:rPr>
-              <a:t>https://www.w3schools.com/jsref/dom_obj_image.asp</a:t>
+              <a:t>https://www.w3schools.com/jsref/event_onclick.asp</a:t>
             </a:r>
             <a:endParaRPr lang="en-US" sz="1800" dirty="0"/>
           </a:p>
@@ -4738,10 +4561,10 @@
       </p:sp>
       <p:pic>
         <p:nvPicPr>
-          <p:cNvPr id="5" name="Picture 4" descr="A picture containing looking, sitting, bird, white&#10;&#10;Description automatically generated">
-            <a:extLst>
-              <a:ext uri="{FF2B5EF4-FFF2-40B4-BE49-F238E27FC236}">
-                <a16:creationId xmlns:a16="http://schemas.microsoft.com/office/drawing/2014/main" id="{3B9B41DD-4D4D-0B4C-B11D-87050BB10C29}"/>
+          <p:cNvPr id="8" name="Picture 7" descr="A close up of a sign&#10;&#10;Description automatically generated">
+            <a:extLst>
+              <a:ext uri="{FF2B5EF4-FFF2-40B4-BE49-F238E27FC236}">
+                <a16:creationId xmlns:a16="http://schemas.microsoft.com/office/drawing/2014/main" id="{36DF79AC-8F40-0D4A-A578-E6E08314B828}"/>
               </a:ext>
             </a:extLst>
           </p:cNvPr>
@@ -4751,75 +4574,15 @@
           <p:nvPr/>
         </p:nvPicPr>
         <p:blipFill>
-          <a:blip r:embed="rId5"/>
+          <a:blip r:embed="rId3"/>
           <a:stretch>
             <a:fillRect/>
           </a:stretch>
         </p:blipFill>
         <p:spPr>
           <a:xfrm>
-            <a:off x="8988926" y="3742291"/>
-            <a:ext cx="1130300" cy="1193800"/>
-          </a:xfrm>
-          <a:prstGeom prst="rect">
-            <a:avLst/>
-          </a:prstGeom>
-        </p:spPr>
-      </p:pic>
-      <p:pic>
-        <p:nvPicPr>
-          <p:cNvPr id="7" name="Picture 6" descr="A close up of a logo&#10;&#10;Description automatically generated">
-            <a:extLst>
-              <a:ext uri="{FF2B5EF4-FFF2-40B4-BE49-F238E27FC236}">
-                <a16:creationId xmlns:a16="http://schemas.microsoft.com/office/drawing/2014/main" id="{32AAACC0-8688-CB41-9FB8-2F837B5B9B8D}"/>
-              </a:ext>
-            </a:extLst>
-          </p:cNvPr>
-          <p:cNvPicPr>
-            <a:picLocks noChangeAspect="1"/>
-          </p:cNvPicPr>
-          <p:nvPr/>
-        </p:nvPicPr>
-        <p:blipFill>
-          <a:blip r:embed="rId6"/>
-          <a:stretch>
-            <a:fillRect/>
-          </a:stretch>
-        </p:blipFill>
-        <p:spPr>
-          <a:xfrm>
-            <a:off x="7513772" y="4393166"/>
-            <a:ext cx="1054100" cy="1085850"/>
-          </a:xfrm>
-          <a:prstGeom prst="rect">
-            <a:avLst/>
-          </a:prstGeom>
-        </p:spPr>
-      </p:pic>
-      <p:pic>
-        <p:nvPicPr>
-          <p:cNvPr id="8" name="Picture 7" descr="A picture containing food, clock&#10;&#10;Description automatically generated">
-            <a:extLst>
-              <a:ext uri="{FF2B5EF4-FFF2-40B4-BE49-F238E27FC236}">
-                <a16:creationId xmlns:a16="http://schemas.microsoft.com/office/drawing/2014/main" id="{A93E903B-F9A3-584F-AA46-BE3F5F0A95E6}"/>
-              </a:ext>
-            </a:extLst>
-          </p:cNvPr>
-          <p:cNvPicPr>
-            <a:picLocks noChangeAspect="1"/>
-          </p:cNvPicPr>
-          <p:nvPr/>
-        </p:nvPicPr>
-        <p:blipFill>
-          <a:blip r:embed="rId7"/>
-          <a:stretch>
-            <a:fillRect/>
-          </a:stretch>
-        </p:blipFill>
-        <p:spPr>
-          <a:xfrm>
-            <a:off x="8845923" y="5195034"/>
-            <a:ext cx="1073150" cy="1041400"/>
+            <a:off x="8997950" y="3890582"/>
+            <a:ext cx="2355850" cy="2047409"/>
           </a:xfrm>
           <a:prstGeom prst="rect">
             <a:avLst/>
@@ -4829,7 +4592,7 @@
     </p:spTree>
     <p:extLst>
       <p:ext uri="{BB962C8B-B14F-4D97-AF65-F5344CB8AC3E}">
-        <p14:creationId xmlns:p14="http://schemas.microsoft.com/office/powerpoint/2010/main" val="2110882223"/>
+        <p14:creationId xmlns:p14="http://schemas.microsoft.com/office/powerpoint/2010/main" val="460880512"/>
       </p:ext>
     </p:extLst>
   </p:cSld>
@@ -4869,53 +4632,6 @@
       </p:grpSpPr>
       <p:sp>
         <p:nvSpPr>
-          <p:cNvPr id="9" name="Oval 8">
-            <a:extLst>
-              <a:ext uri="{FF2B5EF4-FFF2-40B4-BE49-F238E27FC236}">
-                <a16:creationId xmlns:a16="http://schemas.microsoft.com/office/drawing/2014/main" id="{D10C1CBC-6FA7-564A-A72C-24835C409F2A}"/>
-              </a:ext>
-            </a:extLst>
-          </p:cNvPr>
-          <p:cNvSpPr/>
-          <p:nvPr/>
-        </p:nvSpPr>
-        <p:spPr>
-          <a:xfrm>
-            <a:off x="8775212" y="3745523"/>
-            <a:ext cx="2813050" cy="2678121"/>
-          </a:xfrm>
-          <a:prstGeom prst="ellipse">
-            <a:avLst/>
-          </a:prstGeom>
-          <a:ln>
-            <a:noFill/>
-          </a:ln>
-        </p:spPr>
-        <p:style>
-          <a:lnRef idx="2">
-            <a:schemeClr val="accent6"/>
-          </a:lnRef>
-          <a:fillRef idx="1">
-            <a:schemeClr val="lt1"/>
-          </a:fillRef>
-          <a:effectRef idx="0">
-            <a:schemeClr val="accent6"/>
-          </a:effectRef>
-          <a:fontRef idx="minor">
-            <a:schemeClr val="dk1"/>
-          </a:fontRef>
-        </p:style>
-        <p:txBody>
-          <a:bodyPr rtlCol="0" anchor="ctr"/>
-          <a:lstStyle/>
-          <a:p>
-            <a:pPr algn="ctr"/>
-            <a:endParaRPr lang="en-US"/>
-          </a:p>
-        </p:txBody>
-      </p:sp>
-      <p:sp>
-        <p:nvSpPr>
           <p:cNvPr id="2" name="Title 1">
             <a:extLst>
               <a:ext uri="{FF2B5EF4-FFF2-40B4-BE49-F238E27FC236}">
@@ -4969,13 +4685,13 @@
         </p:nvSpPr>
         <p:spPr>
           <a:xfrm>
-            <a:off x="838200" y="1656731"/>
-            <a:ext cx="9933122" cy="4838646"/>
+            <a:off x="838199" y="1656731"/>
+            <a:ext cx="10382573" cy="4838646"/>
           </a:xfrm>
         </p:spPr>
         <p:txBody>
           <a:bodyPr>
-            <a:normAutofit/>
+            <a:normAutofit fontScale="70000" lnSpcReduction="20000"/>
           </a:bodyPr>
           <a:lstStyle/>
           <a:p>
@@ -4988,15 +4704,23 @@
                 <a:ea typeface="Open Sans" panose="020B0606030504020204" pitchFamily="34" charset="0"/>
                 <a:cs typeface="Open Sans" panose="020B0606030504020204" pitchFamily="34" charset="0"/>
               </a:rPr>
-              <a:t>Add an on ‘click’ event listener to the cookie jar &lt;</a:t>
-            </a:r>
-            <a:r>
-              <a:rPr lang="en-US" dirty="0" err="1">
-                <a:latin typeface="Open Sans" panose="020B0606030504020204" pitchFamily="34" charset="0"/>
-                <a:ea typeface="Open Sans" panose="020B0606030504020204" pitchFamily="34" charset="0"/>
-                <a:cs typeface="Open Sans" panose="020B0606030504020204" pitchFamily="34" charset="0"/>
-              </a:rPr>
-              <a:t>img</a:t>
+              <a:t>Create a function called </a:t>
+            </a:r>
+            <a:r>
+              <a:rPr lang="en-US" b="1" dirty="0" err="1">
+                <a:latin typeface="Open Sans" panose="020B0606030504020204" pitchFamily="34" charset="0"/>
+                <a:ea typeface="Open Sans" panose="020B0606030504020204" pitchFamily="34" charset="0"/>
+                <a:cs typeface="Open Sans" panose="020B0606030504020204" pitchFamily="34" charset="0"/>
+              </a:rPr>
+              <a:t>generateCookie</a:t>
+            </a:r>
+            <a:r>
+              <a:rPr lang="en-US" b="1" dirty="0">
+                <a:latin typeface="Open Sans" panose="020B0606030504020204" pitchFamily="34" charset="0"/>
+                <a:ea typeface="Open Sans" panose="020B0606030504020204" pitchFamily="34" charset="0"/>
+                <a:cs typeface="Open Sans" panose="020B0606030504020204" pitchFamily="34" charset="0"/>
+              </a:rPr>
+              <a:t> </a:t>
             </a:r>
             <a:r>
               <a:rPr lang="en-US" dirty="0">
@@ -5004,31 +4728,7 @@
                 <a:ea typeface="Open Sans" panose="020B0606030504020204" pitchFamily="34" charset="0"/>
                 <a:cs typeface="Open Sans" panose="020B0606030504020204" pitchFamily="34" charset="0"/>
               </a:rPr>
-              <a:t>&gt; element that calls on the </a:t>
-            </a:r>
-            <a:r>
-              <a:rPr lang="en-US" b="1" dirty="0" err="1">
-                <a:latin typeface="Open Sans" panose="020B0606030504020204" pitchFamily="34" charset="0"/>
-                <a:ea typeface="Open Sans" panose="020B0606030504020204" pitchFamily="34" charset="0"/>
-                <a:cs typeface="Open Sans" panose="020B0606030504020204" pitchFamily="34" charset="0"/>
-              </a:rPr>
-              <a:t>generateCookie</a:t>
-            </a:r>
-            <a:r>
-              <a:rPr lang="en-US" b="1" dirty="0">
-                <a:latin typeface="Open Sans" panose="020B0606030504020204" pitchFamily="34" charset="0"/>
-                <a:ea typeface="Open Sans" panose="020B0606030504020204" pitchFamily="34" charset="0"/>
-                <a:cs typeface="Open Sans" panose="020B0606030504020204" pitchFamily="34" charset="0"/>
-              </a:rPr>
-              <a:t> </a:t>
-            </a:r>
-            <a:r>
-              <a:rPr lang="en-US" dirty="0">
-                <a:latin typeface="Open Sans" panose="020B0606030504020204" pitchFamily="34" charset="0"/>
-                <a:ea typeface="Open Sans" panose="020B0606030504020204" pitchFamily="34" charset="0"/>
-                <a:cs typeface="Open Sans" panose="020B0606030504020204" pitchFamily="34" charset="0"/>
-              </a:rPr>
-              <a:t>function you made in the last step</a:t>
+              <a:t>that does the following:</a:t>
             </a:r>
           </a:p>
           <a:p>
@@ -5042,8 +4742,9 @@
             </a:endParaRPr>
           </a:p>
           <a:p>
-            <a:pPr marL="0" indent="0">
-              <a:buNone/>
+            <a:pPr marL="514350" indent="-514350">
+              <a:buFont typeface="+mj-lt"/>
+              <a:buAutoNum type="arabicPeriod"/>
             </a:pPr>
             <a:r>
               <a:rPr lang="en-US" dirty="0">
@@ -5051,6 +4752,206 @@
                 <a:ea typeface="Open Sans" panose="020B0606030504020204" pitchFamily="34" charset="0"/>
                 <a:cs typeface="Open Sans" panose="020B0606030504020204" pitchFamily="34" charset="0"/>
               </a:rPr>
+              <a:t>Create an &lt;</a:t>
+            </a:r>
+            <a:r>
+              <a:rPr lang="en-US" dirty="0" err="1">
+                <a:latin typeface="Open Sans" panose="020B0606030504020204" pitchFamily="34" charset="0"/>
+                <a:ea typeface="Open Sans" panose="020B0606030504020204" pitchFamily="34" charset="0"/>
+                <a:cs typeface="Open Sans" panose="020B0606030504020204" pitchFamily="34" charset="0"/>
+              </a:rPr>
+              <a:t>img</a:t>
+            </a:r>
+            <a:r>
+              <a:rPr lang="en-US" dirty="0">
+                <a:latin typeface="Open Sans" panose="020B0606030504020204" pitchFamily="34" charset="0"/>
+                <a:ea typeface="Open Sans" panose="020B0606030504020204" pitchFamily="34" charset="0"/>
+                <a:cs typeface="Open Sans" panose="020B0606030504020204" pitchFamily="34" charset="0"/>
+              </a:rPr>
+              <a:t>&gt; element</a:t>
+            </a:r>
+          </a:p>
+          <a:p>
+            <a:pPr marL="514350" indent="-514350">
+              <a:buFont typeface="+mj-lt"/>
+              <a:buAutoNum type="arabicPeriod"/>
+            </a:pPr>
+            <a:r>
+              <a:rPr lang="en-US" dirty="0">
+                <a:latin typeface="Open Sans" panose="020B0606030504020204" pitchFamily="34" charset="0"/>
+                <a:ea typeface="Open Sans" panose="020B0606030504020204" pitchFamily="34" charset="0"/>
+                <a:cs typeface="Open Sans" panose="020B0606030504020204" pitchFamily="34" charset="0"/>
+              </a:rPr>
+              <a:t>Adds the ‘cookie’ class to the element</a:t>
+            </a:r>
+          </a:p>
+          <a:p>
+            <a:pPr marL="514350" indent="-514350">
+              <a:buFont typeface="+mj-lt"/>
+              <a:buAutoNum type="arabicPeriod"/>
+            </a:pPr>
+            <a:r>
+              <a:rPr lang="en-US" dirty="0">
+                <a:latin typeface="Open Sans" panose="020B0606030504020204" pitchFamily="34" charset="0"/>
+                <a:ea typeface="Open Sans" panose="020B0606030504020204" pitchFamily="34" charset="0"/>
+                <a:cs typeface="Open Sans" panose="020B0606030504020204" pitchFamily="34" charset="0"/>
+              </a:rPr>
+              <a:t>Adjust the element based on the type of cookie selected in the dropdown menu</a:t>
+            </a:r>
+          </a:p>
+          <a:p>
+            <a:pPr lvl="1"/>
+            <a:r>
+              <a:rPr lang="en-US" dirty="0">
+                <a:latin typeface="Open Sans" panose="020B0606030504020204" pitchFamily="34" charset="0"/>
+                <a:ea typeface="Open Sans" panose="020B0606030504020204" pitchFamily="34" charset="0"/>
+                <a:cs typeface="Open Sans" panose="020B0606030504020204" pitchFamily="34" charset="0"/>
+              </a:rPr>
+              <a:t>Use the </a:t>
+            </a:r>
+            <a:r>
+              <a:rPr lang="en-US" i="1" dirty="0" err="1">
+                <a:latin typeface="Open Sans" panose="020B0606030504020204" pitchFamily="34" charset="0"/>
+                <a:ea typeface="Open Sans" panose="020B0606030504020204" pitchFamily="34" charset="0"/>
+                <a:cs typeface="Open Sans" panose="020B0606030504020204" pitchFamily="34" charset="0"/>
+              </a:rPr>
+              <a:t>selectedCookie</a:t>
+            </a:r>
+            <a:r>
+              <a:rPr lang="en-US" dirty="0">
+                <a:latin typeface="Open Sans" panose="020B0606030504020204" pitchFamily="34" charset="0"/>
+                <a:ea typeface="Open Sans" panose="020B0606030504020204" pitchFamily="34" charset="0"/>
+                <a:cs typeface="Open Sans" panose="020B0606030504020204" pitchFamily="34" charset="0"/>
+              </a:rPr>
+              <a:t> variable to: </a:t>
+            </a:r>
+          </a:p>
+          <a:p>
+            <a:pPr lvl="2"/>
+            <a:r>
+              <a:rPr lang="en-US" dirty="0">
+                <a:latin typeface="Open Sans" panose="020B0606030504020204" pitchFamily="34" charset="0"/>
+                <a:ea typeface="Open Sans" panose="020B0606030504020204" pitchFamily="34" charset="0"/>
+                <a:cs typeface="Open Sans" panose="020B0606030504020204" pitchFamily="34" charset="0"/>
+              </a:rPr>
+              <a:t>assign the </a:t>
+            </a:r>
+            <a:r>
+              <a:rPr lang="en-US" dirty="0" err="1">
+                <a:latin typeface="Open Sans" panose="020B0606030504020204" pitchFamily="34" charset="0"/>
+                <a:ea typeface="Open Sans" panose="020B0606030504020204" pitchFamily="34" charset="0"/>
+                <a:cs typeface="Open Sans" panose="020B0606030504020204" pitchFamily="34" charset="0"/>
+              </a:rPr>
+              <a:t>src</a:t>
+            </a:r>
+            <a:r>
+              <a:rPr lang="en-US" dirty="0">
+                <a:latin typeface="Open Sans" panose="020B0606030504020204" pitchFamily="34" charset="0"/>
+                <a:ea typeface="Open Sans" panose="020B0606030504020204" pitchFamily="34" charset="0"/>
+                <a:cs typeface="Open Sans" panose="020B0606030504020204" pitchFamily="34" charset="0"/>
+              </a:rPr>
+              <a:t> of </a:t>
+            </a:r>
+            <a:r>
+              <a:rPr lang="en-US" dirty="0" err="1">
+                <a:latin typeface="Open Sans" panose="020B0606030504020204" pitchFamily="34" charset="0"/>
+                <a:ea typeface="Open Sans" panose="020B0606030504020204" pitchFamily="34" charset="0"/>
+                <a:cs typeface="Open Sans" panose="020B0606030504020204" pitchFamily="34" charset="0"/>
+              </a:rPr>
+              <a:t>img</a:t>
+            </a:r>
+            <a:r>
+              <a:rPr lang="en-US" dirty="0">
+                <a:latin typeface="Open Sans" panose="020B0606030504020204" pitchFamily="34" charset="0"/>
+                <a:ea typeface="Open Sans" panose="020B0606030504020204" pitchFamily="34" charset="0"/>
+                <a:cs typeface="Open Sans" panose="020B0606030504020204" pitchFamily="34" charset="0"/>
+              </a:rPr>
+              <a:t> element</a:t>
+            </a:r>
+          </a:p>
+          <a:p>
+            <a:pPr lvl="2"/>
+            <a:r>
+              <a:rPr lang="en-US" dirty="0">
+                <a:latin typeface="Open Sans" panose="020B0606030504020204" pitchFamily="34" charset="0"/>
+                <a:ea typeface="Open Sans" panose="020B0606030504020204" pitchFamily="34" charset="0"/>
+                <a:cs typeface="Open Sans" panose="020B0606030504020204" pitchFamily="34" charset="0"/>
+              </a:rPr>
+              <a:t>Add a unique class to the </a:t>
+            </a:r>
+            <a:r>
+              <a:rPr lang="en-US" dirty="0" err="1">
+                <a:latin typeface="Open Sans" panose="020B0606030504020204" pitchFamily="34" charset="0"/>
+                <a:ea typeface="Open Sans" panose="020B0606030504020204" pitchFamily="34" charset="0"/>
+                <a:cs typeface="Open Sans" panose="020B0606030504020204" pitchFamily="34" charset="0"/>
+              </a:rPr>
+              <a:t>img</a:t>
+            </a:r>
+            <a:r>
+              <a:rPr lang="en-US" dirty="0">
+                <a:latin typeface="Open Sans" panose="020B0606030504020204" pitchFamily="34" charset="0"/>
+                <a:ea typeface="Open Sans" panose="020B0606030504020204" pitchFamily="34" charset="0"/>
+                <a:cs typeface="Open Sans" panose="020B0606030504020204" pitchFamily="34" charset="0"/>
+              </a:rPr>
+              <a:t> element</a:t>
+            </a:r>
+          </a:p>
+          <a:p>
+            <a:pPr marL="514350" indent="-514350">
+              <a:buFont typeface="+mj-lt"/>
+              <a:buAutoNum type="arabicPeriod"/>
+            </a:pPr>
+            <a:r>
+              <a:rPr lang="en-US" dirty="0">
+                <a:latin typeface="Open Sans" panose="020B0606030504020204" pitchFamily="34" charset="0"/>
+                <a:ea typeface="Open Sans" panose="020B0606030504020204" pitchFamily="34" charset="0"/>
+                <a:cs typeface="Open Sans" panose="020B0606030504020204" pitchFamily="34" charset="0"/>
+              </a:rPr>
+              <a:t>Append cookie &lt;</a:t>
+            </a:r>
+            <a:r>
+              <a:rPr lang="en-US" dirty="0" err="1">
+                <a:latin typeface="Open Sans" panose="020B0606030504020204" pitchFamily="34" charset="0"/>
+                <a:ea typeface="Open Sans" panose="020B0606030504020204" pitchFamily="34" charset="0"/>
+                <a:cs typeface="Open Sans" panose="020B0606030504020204" pitchFamily="34" charset="0"/>
+              </a:rPr>
+              <a:t>img</a:t>
+            </a:r>
+            <a:r>
+              <a:rPr lang="en-US" dirty="0">
+                <a:latin typeface="Open Sans" panose="020B0606030504020204" pitchFamily="34" charset="0"/>
+                <a:ea typeface="Open Sans" panose="020B0606030504020204" pitchFamily="34" charset="0"/>
+                <a:cs typeface="Open Sans" panose="020B0606030504020204" pitchFamily="34" charset="0"/>
+              </a:rPr>
+              <a:t>&gt; element to the </a:t>
+            </a:r>
+            <a:br>
+              <a:rPr lang="en-US" dirty="0">
+                <a:latin typeface="Open Sans" panose="020B0606030504020204" pitchFamily="34" charset="0"/>
+                <a:ea typeface="Open Sans" panose="020B0606030504020204" pitchFamily="34" charset="0"/>
+                <a:cs typeface="Open Sans" panose="020B0606030504020204" pitchFamily="34" charset="0"/>
+              </a:rPr>
+            </a:br>
+            <a:r>
+              <a:rPr lang="en-US" i="1" dirty="0">
+                <a:latin typeface="Open Sans" panose="020B0606030504020204" pitchFamily="34" charset="0"/>
+                <a:ea typeface="Open Sans" panose="020B0606030504020204" pitchFamily="34" charset="0"/>
+                <a:cs typeface="Open Sans" panose="020B0606030504020204" pitchFamily="34" charset="0"/>
+              </a:rPr>
+              <a:t>#cookie-container</a:t>
+            </a:r>
+          </a:p>
+          <a:p>
+            <a:pPr marL="514350" indent="-514350">
+              <a:buFont typeface="+mj-lt"/>
+              <a:buAutoNum type="arabicPeriod"/>
+            </a:pPr>
+            <a:r>
+              <a:rPr lang="en-US" dirty="0">
+                <a:latin typeface="Open Sans" panose="020B0606030504020204" pitchFamily="34" charset="0"/>
+                <a:ea typeface="Open Sans" panose="020B0606030504020204" pitchFamily="34" charset="0"/>
+                <a:cs typeface="Open Sans" panose="020B0606030504020204" pitchFamily="34" charset="0"/>
+              </a:rPr>
               <a:t>Whenever you click on the cookie jar </a:t>
             </a:r>
             <a:r>
@@ -5071,8 +4972,9 @@
             </a:r>
           </a:p>
           <a:p>
-            <a:pPr marL="0" indent="0">
-              <a:buNone/>
+            <a:pPr marL="514350" indent="-514350">
+              <a:buFont typeface="+mj-lt"/>
+              <a:buAutoNum type="arabicPeriod"/>
             </a:pPr>
             <a:endParaRPr lang="en-US" dirty="0">
               <a:latin typeface="Open Sans" panose="020B0606030504020204" pitchFamily="34" charset="0"/>
@@ -5101,7 +5003,31 @@
               <a:rPr lang="en-US" sz="1800" dirty="0">
                 <a:hlinkClick r:id="rId2"/>
               </a:rPr>
-              <a:t>https://www.w3schools.com/jsref/event_onclick.asp</a:t>
+              <a:t>https://developer.mozilla.org/en-US/docs/Web/API/Element/classList</a:t>
+            </a:r>
+            <a:endParaRPr lang="en-US" sz="1800" dirty="0"/>
+          </a:p>
+          <a:p>
+            <a:pPr marL="0" indent="0">
+              <a:buNone/>
+            </a:pPr>
+            <a:r>
+              <a:rPr lang="en-US" sz="1800" dirty="0">
+                <a:hlinkClick r:id="rId3"/>
+              </a:rPr>
+              <a:t>https://developer.mozilla.org/en-US/docs/Web/API/ParentNode/append</a:t>
+            </a:r>
+            <a:endParaRPr lang="en-US" sz="1800" dirty="0"/>
+          </a:p>
+          <a:p>
+            <a:pPr marL="0" indent="0">
+              <a:buNone/>
+            </a:pPr>
+            <a:r>
+              <a:rPr lang="en-US" sz="1800" dirty="0">
+                <a:hlinkClick r:id="rId4"/>
+              </a:rPr>
+              <a:t>https://www.w3schools.com/jsref/dom_obj_image.asp</a:t>
             </a:r>
             <a:endParaRPr lang="en-US" sz="1800" dirty="0"/>
           </a:p>
@@ -5109,10 +5035,10 @@
       </p:sp>
       <p:pic>
         <p:nvPicPr>
-          <p:cNvPr id="8" name="Picture 7" descr="A close up of a sign&#10;&#10;Description automatically generated">
-            <a:extLst>
-              <a:ext uri="{FF2B5EF4-FFF2-40B4-BE49-F238E27FC236}">
-                <a16:creationId xmlns:a16="http://schemas.microsoft.com/office/drawing/2014/main" id="{36DF79AC-8F40-0D4A-A578-E6E08314B828}"/>
+          <p:cNvPr id="5" name="Picture 4" descr="A picture containing looking, sitting, bird, white&#10;&#10;Description automatically generated">
+            <a:extLst>
+              <a:ext uri="{FF2B5EF4-FFF2-40B4-BE49-F238E27FC236}">
+                <a16:creationId xmlns:a16="http://schemas.microsoft.com/office/drawing/2014/main" id="{3B9B41DD-4D4D-0B4C-B11D-87050BB10C29}"/>
               </a:ext>
             </a:extLst>
           </p:cNvPr>
@@ -5122,15 +5048,75 @@
           <p:nvPr/>
         </p:nvPicPr>
         <p:blipFill>
-          <a:blip r:embed="rId3"/>
+          <a:blip r:embed="rId5"/>
           <a:stretch>
             <a:fillRect/>
           </a:stretch>
         </p:blipFill>
         <p:spPr>
           <a:xfrm>
-            <a:off x="8997950" y="3890582"/>
-            <a:ext cx="2355850" cy="2047409"/>
+            <a:off x="9919073" y="3687443"/>
+            <a:ext cx="1130300" cy="1193800"/>
+          </a:xfrm>
+          <a:prstGeom prst="rect">
+            <a:avLst/>
+          </a:prstGeom>
+        </p:spPr>
+      </p:pic>
+      <p:pic>
+        <p:nvPicPr>
+          <p:cNvPr id="7" name="Picture 6" descr="A close up of a logo&#10;&#10;Description automatically generated">
+            <a:extLst>
+              <a:ext uri="{FF2B5EF4-FFF2-40B4-BE49-F238E27FC236}">
+                <a16:creationId xmlns:a16="http://schemas.microsoft.com/office/drawing/2014/main" id="{32AAACC0-8688-CB41-9FB8-2F837B5B9B8D}"/>
+              </a:ext>
+            </a:extLst>
+          </p:cNvPr>
+          <p:cNvPicPr>
+            <a:picLocks noChangeAspect="1"/>
+          </p:cNvPicPr>
+          <p:nvPr/>
+        </p:nvPicPr>
+        <p:blipFill>
+          <a:blip r:embed="rId6"/>
+          <a:stretch>
+            <a:fillRect/>
+          </a:stretch>
+        </p:blipFill>
+        <p:spPr>
+          <a:xfrm>
+            <a:off x="7017174" y="5195034"/>
+            <a:ext cx="1054100" cy="1085850"/>
+          </a:xfrm>
+          <a:prstGeom prst="rect">
+            <a:avLst/>
+          </a:prstGeom>
+        </p:spPr>
+      </p:pic>
+      <p:pic>
+        <p:nvPicPr>
+          <p:cNvPr id="8" name="Picture 7" descr="A picture containing food, clock&#10;&#10;Description automatically generated">
+            <a:extLst>
+              <a:ext uri="{FF2B5EF4-FFF2-40B4-BE49-F238E27FC236}">
+                <a16:creationId xmlns:a16="http://schemas.microsoft.com/office/drawing/2014/main" id="{A93E903B-F9A3-584F-AA46-BE3F5F0A95E6}"/>
+              </a:ext>
+            </a:extLst>
+          </p:cNvPr>
+          <p:cNvPicPr>
+            <a:picLocks noChangeAspect="1"/>
+          </p:cNvPicPr>
+          <p:nvPr/>
+        </p:nvPicPr>
+        <p:blipFill>
+          <a:blip r:embed="rId7"/>
+          <a:stretch>
+            <a:fillRect/>
+          </a:stretch>
+        </p:blipFill>
+        <p:spPr>
+          <a:xfrm>
+            <a:off x="8845923" y="5195034"/>
+            <a:ext cx="1073150" cy="1041400"/>
           </a:xfrm>
           <a:prstGeom prst="rect">
             <a:avLst/>
@@ -5140,7 +5126,7 @@
     </p:spTree>
     <p:extLst>
       <p:ext uri="{BB962C8B-B14F-4D97-AF65-F5344CB8AC3E}">
-        <p14:creationId xmlns:p14="http://schemas.microsoft.com/office/powerpoint/2010/main" val="460880512"/>
+        <p14:creationId xmlns:p14="http://schemas.microsoft.com/office/powerpoint/2010/main" val="2110882223"/>
       </p:ext>
     </p:extLst>
   </p:cSld>

</xml_diff>